<commit_message>
Adding Autofocus to the Code - testing only
</commit_message>
<xml_diff>
--- a/IMAGES/ESP32MicroscopeVariations.pptx
+++ b/IMAGES/ESP32MicroscopeVariations.pptx
@@ -104,6 +104,11 @@
       </a:defRPr>
     </a:lvl9pPr>
   </p:defaultTextStyle>
+  <p:extLst>
+    <p:ext uri="{EFAFB233-063F-42B5-8137-9DF3F51BA10A}">
+      <p15:sldGuideLst xmlns:p15="http://schemas.microsoft.com/office/powerpoint/2012/main"/>
+    </p:ext>
+  </p:extLst>
 </p:presentation>
 </file>
 
@@ -256,7 +261,7 @@
           <a:p>
             <a:fld id="{6A2AEA48-8BBA-2F4C-ADB7-F19F9927C803}" type="datetimeFigureOut">
               <a:rPr lang="en-GB" smtClean="0"/>
-              <a:t>07/06/2022</a:t>
+              <a:t>16/06/2022</a:t>
             </a:fld>
             <a:endParaRPr lang="en-GB"/>
           </a:p>
@@ -456,7 +461,7 @@
           <a:p>
             <a:fld id="{6A2AEA48-8BBA-2F4C-ADB7-F19F9927C803}" type="datetimeFigureOut">
               <a:rPr lang="en-GB" smtClean="0"/>
-              <a:t>07/06/2022</a:t>
+              <a:t>16/06/2022</a:t>
             </a:fld>
             <a:endParaRPr lang="en-GB"/>
           </a:p>
@@ -666,7 +671,7 @@
           <a:p>
             <a:fld id="{6A2AEA48-8BBA-2F4C-ADB7-F19F9927C803}" type="datetimeFigureOut">
               <a:rPr lang="en-GB" smtClean="0"/>
-              <a:t>07/06/2022</a:t>
+              <a:t>16/06/2022</a:t>
             </a:fld>
             <a:endParaRPr lang="en-GB"/>
           </a:p>
@@ -866,7 +871,7 @@
           <a:p>
             <a:fld id="{6A2AEA48-8BBA-2F4C-ADB7-F19F9927C803}" type="datetimeFigureOut">
               <a:rPr lang="en-GB" smtClean="0"/>
-              <a:t>07/06/2022</a:t>
+              <a:t>16/06/2022</a:t>
             </a:fld>
             <a:endParaRPr lang="en-GB"/>
           </a:p>
@@ -1142,7 +1147,7 @@
           <a:p>
             <a:fld id="{6A2AEA48-8BBA-2F4C-ADB7-F19F9927C803}" type="datetimeFigureOut">
               <a:rPr lang="en-GB" smtClean="0"/>
-              <a:t>07/06/2022</a:t>
+              <a:t>16/06/2022</a:t>
             </a:fld>
             <a:endParaRPr lang="en-GB"/>
           </a:p>
@@ -1410,7 +1415,7 @@
           <a:p>
             <a:fld id="{6A2AEA48-8BBA-2F4C-ADB7-F19F9927C803}" type="datetimeFigureOut">
               <a:rPr lang="en-GB" smtClean="0"/>
-              <a:t>07/06/2022</a:t>
+              <a:t>16/06/2022</a:t>
             </a:fld>
             <a:endParaRPr lang="en-GB"/>
           </a:p>
@@ -1825,7 +1830,7 @@
           <a:p>
             <a:fld id="{6A2AEA48-8BBA-2F4C-ADB7-F19F9927C803}" type="datetimeFigureOut">
               <a:rPr lang="en-GB" smtClean="0"/>
-              <a:t>07/06/2022</a:t>
+              <a:t>16/06/2022</a:t>
             </a:fld>
             <a:endParaRPr lang="en-GB"/>
           </a:p>
@@ -1967,7 +1972,7 @@
           <a:p>
             <a:fld id="{6A2AEA48-8BBA-2F4C-ADB7-F19F9927C803}" type="datetimeFigureOut">
               <a:rPr lang="en-GB" smtClean="0"/>
-              <a:t>07/06/2022</a:t>
+              <a:t>16/06/2022</a:t>
             </a:fld>
             <a:endParaRPr lang="en-GB"/>
           </a:p>
@@ -2080,7 +2085,7 @@
           <a:p>
             <a:fld id="{6A2AEA48-8BBA-2F4C-ADB7-F19F9927C803}" type="datetimeFigureOut">
               <a:rPr lang="en-GB" smtClean="0"/>
-              <a:t>07/06/2022</a:t>
+              <a:t>16/06/2022</a:t>
             </a:fld>
             <a:endParaRPr lang="en-GB"/>
           </a:p>
@@ -2393,7 +2398,7 @@
           <a:p>
             <a:fld id="{6A2AEA48-8BBA-2F4C-ADB7-F19F9927C803}" type="datetimeFigureOut">
               <a:rPr lang="en-GB" smtClean="0"/>
-              <a:t>07/06/2022</a:t>
+              <a:t>16/06/2022</a:t>
             </a:fld>
             <a:endParaRPr lang="en-GB"/>
           </a:p>
@@ -2682,7 +2687,7 @@
           <a:p>
             <a:fld id="{6A2AEA48-8BBA-2F4C-ADB7-F19F9927C803}" type="datetimeFigureOut">
               <a:rPr lang="en-GB" smtClean="0"/>
-              <a:t>07/06/2022</a:t>
+              <a:t>16/06/2022</a:t>
             </a:fld>
             <a:endParaRPr lang="en-GB"/>
           </a:p>
@@ -2925,7 +2930,7 @@
           <a:p>
             <a:fld id="{6A2AEA48-8BBA-2F4C-ADB7-F19F9927C803}" type="datetimeFigureOut">
               <a:rPr lang="en-GB" smtClean="0"/>
-              <a:t>07/06/2022</a:t>
+              <a:t>16/06/2022</a:t>
             </a:fld>
             <a:endParaRPr lang="en-GB"/>
           </a:p>
@@ -3566,8 +3571,8 @@
         </p:nvSpPr>
         <p:spPr>
           <a:xfrm>
-            <a:off x="4102224" y="3132460"/>
-            <a:ext cx="2414690" cy="2585323"/>
+            <a:off x="4102224" y="4231918"/>
+            <a:ext cx="2414690" cy="2062103"/>
           </a:xfrm>
           <a:prstGeom prst="rect">
             <a:avLst/>
@@ -3598,7 +3603,7 @@
               <a:buChar char="•"/>
             </a:pPr>
             <a:r>
-              <a:rPr lang="en-GB" dirty="0"/>
+              <a:rPr lang="en-GB" sz="1600" dirty="0"/>
               <a:t>timelapse</a:t>
             </a:r>
           </a:p>
@@ -3608,7 +3613,7 @@
               <a:buChar char="•"/>
             </a:pPr>
             <a:r>
-              <a:rPr lang="en-GB" dirty="0"/>
+              <a:rPr lang="en-GB" sz="1600" dirty="0"/>
               <a:t>stream stays on</a:t>
             </a:r>
           </a:p>
@@ -3618,7 +3623,7 @@
               <a:buChar char="•"/>
             </a:pPr>
             <a:r>
-              <a:rPr lang="en-GB" dirty="0"/>
+              <a:rPr lang="en-GB" sz="1600" dirty="0"/>
               <a:t>FTP Server for file download</a:t>
             </a:r>
           </a:p>
@@ -3628,7 +3633,7 @@
               <a:buChar char="•"/>
             </a:pPr>
             <a:r>
-              <a:rPr lang="en-GB" dirty="0"/>
+              <a:rPr lang="en-GB" sz="1600" dirty="0"/>
               <a:t>save images on SD card</a:t>
             </a:r>
           </a:p>
@@ -3638,7 +3643,7 @@
               <a:buChar char="•"/>
             </a:pPr>
             <a:r>
-              <a:rPr lang="en-GB" dirty="0"/>
+              <a:rPr lang="en-GB" sz="1600" dirty="0"/>
               <a:t>provide website for settings </a:t>
             </a:r>
           </a:p>
@@ -3647,7 +3652,7 @@
               <a:buFont typeface="Arial" panose="020B0604020202020204" pitchFamily="34" charset="0"/>
               <a:buChar char="•"/>
             </a:pPr>
-            <a:endParaRPr lang="en-GB" dirty="0"/>
+            <a:endParaRPr lang="en-GB" sz="1600" dirty="0"/>
           </a:p>
         </p:txBody>
       </p:sp>
@@ -3665,8 +3670,8 @@
         </p:nvSpPr>
         <p:spPr>
           <a:xfrm>
-            <a:off x="959882" y="3084063"/>
-            <a:ext cx="2414690" cy="2031325"/>
+            <a:off x="959882" y="4183521"/>
+            <a:ext cx="2414690" cy="1569660"/>
           </a:xfrm>
           <a:prstGeom prst="rect">
             <a:avLst/>
@@ -3697,7 +3702,7 @@
               <a:buChar char="•"/>
             </a:pPr>
             <a:r>
-              <a:rPr lang="en-GB" dirty="0"/>
+              <a:rPr lang="en-GB" sz="1600" dirty="0"/>
               <a:t>live stream</a:t>
             </a:r>
           </a:p>
@@ -3707,15 +3712,15 @@
               <a:buChar char="•"/>
             </a:pPr>
             <a:r>
-              <a:rPr lang="en-GB" dirty="0"/>
+              <a:rPr lang="en-GB" sz="1600" dirty="0"/>
               <a:t>set additional motors/</a:t>
             </a:r>
             <a:r>
-              <a:rPr lang="en-GB" dirty="0" err="1"/>
+              <a:rPr lang="en-GB" sz="1600" dirty="0" err="1"/>
               <a:t>leds</a:t>
             </a:r>
             <a:r>
-              <a:rPr lang="en-GB" dirty="0"/>
+              <a:rPr lang="en-GB" sz="1600" dirty="0"/>
               <a:t> </a:t>
             </a:r>
           </a:p>
@@ -3725,7 +3730,7 @@
               <a:buChar char="•"/>
             </a:pPr>
             <a:r>
-              <a:rPr lang="en-GB" dirty="0"/>
+              <a:rPr lang="en-GB" sz="1600" dirty="0"/>
               <a:t>save/download images </a:t>
             </a:r>
           </a:p>
@@ -3735,7 +3740,7 @@
               <a:buChar char="•"/>
             </a:pPr>
             <a:r>
-              <a:rPr lang="en-GB" dirty="0"/>
+              <a:rPr lang="en-GB" sz="1600" dirty="0"/>
               <a:t>Send to cloud for processing </a:t>
             </a:r>
           </a:p>
@@ -3805,8 +3810,8 @@
         </p:nvSpPr>
         <p:spPr>
           <a:xfrm>
-            <a:off x="10386909" y="3105833"/>
-            <a:ext cx="2414690" cy="1200329"/>
+            <a:off x="10386909" y="4205291"/>
+            <a:ext cx="2414690" cy="1569660"/>
           </a:xfrm>
           <a:prstGeom prst="rect">
             <a:avLst/>
@@ -3837,7 +3842,7 @@
               <a:buChar char="•"/>
             </a:pPr>
             <a:r>
-              <a:rPr lang="en-GB" dirty="0"/>
+              <a:rPr lang="en-GB" sz="1600" dirty="0"/>
               <a:t>get frames</a:t>
             </a:r>
           </a:p>
@@ -3847,7 +3852,7 @@
               <a:buChar char="•"/>
             </a:pPr>
             <a:r>
-              <a:rPr lang="en-GB" dirty="0"/>
+              <a:rPr lang="en-GB" sz="1600" dirty="0"/>
               <a:t>get live stream (low res)</a:t>
             </a:r>
           </a:p>
@@ -3857,9 +3862,34 @@
               <a:buChar char="•"/>
             </a:pPr>
             <a:r>
-              <a:rPr lang="en-GB" dirty="0"/>
+              <a:rPr lang="en-GB" sz="1600" dirty="0"/>
               <a:t>set parameters</a:t>
             </a:r>
+          </a:p>
+          <a:p>
+            <a:pPr marL="285750" indent="-285750">
+              <a:buFont typeface="Arial" panose="020B0604020202020204" pitchFamily="34" charset="0"/>
+              <a:buChar char="•"/>
+            </a:pPr>
+            <a:r>
+              <a:rPr lang="en-GB" sz="1600" dirty="0"/>
+              <a:t>stable </a:t>
+            </a:r>
+            <a:r>
+              <a:rPr lang="en-GB" sz="1600" dirty="0" err="1"/>
+              <a:t>wifi</a:t>
+            </a:r>
+            <a:r>
+              <a:rPr lang="en-GB" sz="1600" dirty="0"/>
+              <a:t> connection</a:t>
+            </a:r>
+          </a:p>
+          <a:p>
+            <a:pPr marL="285750" indent="-285750">
+              <a:buFont typeface="Arial" panose="020B0604020202020204" pitchFamily="34" charset="0"/>
+              <a:buChar char="•"/>
+            </a:pPr>
+            <a:endParaRPr lang="en-GB" sz="1600" dirty="0"/>
           </a:p>
         </p:txBody>
       </p:sp>
@@ -3877,8 +3907,8 @@
         </p:nvSpPr>
         <p:spPr>
           <a:xfrm>
-            <a:off x="7384390" y="3084063"/>
-            <a:ext cx="2414690" cy="1477328"/>
+            <a:off x="7244566" y="4225852"/>
+            <a:ext cx="2414690" cy="1323439"/>
           </a:xfrm>
           <a:prstGeom prst="rect">
             <a:avLst/>
@@ -3914,7 +3944,7 @@
               <a:buChar char="•"/>
             </a:pPr>
             <a:r>
-              <a:rPr lang="en-GB" dirty="0"/>
+              <a:rPr lang="en-GB" sz="1600" dirty="0"/>
               <a:t>live stream</a:t>
             </a:r>
           </a:p>
@@ -3924,7 +3954,7 @@
               <a:buChar char="•"/>
             </a:pPr>
             <a:r>
-              <a:rPr lang="en-GB" dirty="0"/>
+              <a:rPr lang="en-GB" sz="1600" dirty="0"/>
               <a:t>settings</a:t>
             </a:r>
           </a:p>
@@ -3934,7 +3964,7 @@
               <a:buChar char="•"/>
             </a:pPr>
             <a:r>
-              <a:rPr lang="en-GB" dirty="0"/>
+              <a:rPr lang="en-GB" sz="1600" dirty="0"/>
               <a:t>provide webpage </a:t>
             </a:r>
           </a:p>
@@ -3944,15 +3974,15 @@
               <a:buChar char="•"/>
             </a:pPr>
             <a:r>
-              <a:rPr lang="en-GB" dirty="0"/>
+              <a:rPr lang="en-GB" sz="1600" dirty="0"/>
               <a:t>low-power </a:t>
             </a:r>
             <a:r>
-              <a:rPr lang="en-GB" dirty="0" err="1"/>
+              <a:rPr lang="en-GB" sz="1600" dirty="0" err="1"/>
               <a:t>timelase</a:t>
             </a:r>
             <a:r>
-              <a:rPr lang="en-GB" dirty="0"/>
+              <a:rPr lang="en-GB" sz="1600" dirty="0"/>
               <a:t> to SD card </a:t>
             </a:r>
           </a:p>
@@ -4187,6 +4217,238 @@
           </a:fontRef>
         </p:style>
       </p:cxnSp>
+      <p:sp>
+        <p:nvSpPr>
+          <p:cNvPr id="25" name="Textfeld 24">
+            <a:extLst>
+              <a:ext uri="{FF2B5EF4-FFF2-40B4-BE49-F238E27FC236}">
+                <a16:creationId xmlns:a16="http://schemas.microsoft.com/office/drawing/2014/main" id="{4B01F76D-CE59-35DE-771D-B779D942A36E}"/>
+              </a:ext>
+            </a:extLst>
+          </p:cNvPr>
+          <p:cNvSpPr txBox="1"/>
+          <p:nvPr/>
+        </p:nvSpPr>
+        <p:spPr>
+          <a:xfrm>
+            <a:off x="4102226" y="2913254"/>
+            <a:ext cx="2414690" cy="830997"/>
+          </a:xfrm>
+          <a:prstGeom prst="rect">
+            <a:avLst/>
+          </a:prstGeom>
+        </p:spPr>
+        <p:style>
+          <a:lnRef idx="2">
+            <a:schemeClr val="dk1"/>
+          </a:lnRef>
+          <a:fillRef idx="1">
+            <a:schemeClr val="lt1"/>
+          </a:fillRef>
+          <a:effectRef idx="0">
+            <a:schemeClr val="dk1"/>
+          </a:effectRef>
+          <a:fontRef idx="minor">
+            <a:schemeClr val="dk1"/>
+          </a:fontRef>
+        </p:style>
+        <p:txBody>
+          <a:bodyPr wrap="square" rtlCol="0">
+            <a:spAutoFit/>
+          </a:bodyPr>
+          <a:lstStyle/>
+          <a:p>
+            <a:pPr marL="285750" indent="-285750">
+              <a:buFontTx/>
+              <a:buChar char="-"/>
+            </a:pPr>
+            <a:r>
+              <a:rPr lang="en-GB" sz="1600" dirty="0"/>
+              <a:t>Long-term observations in cell incubator</a:t>
+            </a:r>
+          </a:p>
+          <a:p>
+            <a:pPr marL="285750" indent="-285750">
+              <a:buFontTx/>
+              <a:buChar char="-"/>
+            </a:pPr>
+            <a:endParaRPr lang="en-GB" sz="1600" dirty="0"/>
+          </a:p>
+        </p:txBody>
+      </p:sp>
+      <p:sp>
+        <p:nvSpPr>
+          <p:cNvPr id="26" name="Textfeld 25">
+            <a:extLst>
+              <a:ext uri="{FF2B5EF4-FFF2-40B4-BE49-F238E27FC236}">
+                <a16:creationId xmlns:a16="http://schemas.microsoft.com/office/drawing/2014/main" id="{62400FE0-DCAC-4B06-15B9-9B0591CE8212}"/>
+              </a:ext>
+            </a:extLst>
+          </p:cNvPr>
+          <p:cNvSpPr txBox="1"/>
+          <p:nvPr/>
+        </p:nvSpPr>
+        <p:spPr>
+          <a:xfrm>
+            <a:off x="7244568" y="3051753"/>
+            <a:ext cx="2414690" cy="1077218"/>
+          </a:xfrm>
+          <a:prstGeom prst="rect">
+            <a:avLst/>
+          </a:prstGeom>
+        </p:spPr>
+        <p:style>
+          <a:lnRef idx="2">
+            <a:schemeClr val="dk1"/>
+          </a:lnRef>
+          <a:fillRef idx="1">
+            <a:schemeClr val="lt1"/>
+          </a:fillRef>
+          <a:effectRef idx="0">
+            <a:schemeClr val="dk1"/>
+          </a:effectRef>
+          <a:fontRef idx="minor">
+            <a:schemeClr val="dk1"/>
+          </a:fontRef>
+        </p:style>
+        <p:txBody>
+          <a:bodyPr wrap="square" rtlCol="0">
+            <a:spAutoFit/>
+          </a:bodyPr>
+          <a:lstStyle/>
+          <a:p>
+            <a:pPr marL="285750" indent="-285750">
+              <a:buFontTx/>
+              <a:buChar char="-"/>
+            </a:pPr>
+            <a:r>
+              <a:rPr lang="en-GB" sz="1600" dirty="0"/>
+              <a:t>observe growth of biofilms in situ autonomously</a:t>
+            </a:r>
+          </a:p>
+          <a:p>
+            <a:endParaRPr lang="en-GB" sz="1600" dirty="0"/>
+          </a:p>
+        </p:txBody>
+      </p:sp>
+      <p:sp>
+        <p:nvSpPr>
+          <p:cNvPr id="27" name="Textfeld 26">
+            <a:extLst>
+              <a:ext uri="{FF2B5EF4-FFF2-40B4-BE49-F238E27FC236}">
+                <a16:creationId xmlns:a16="http://schemas.microsoft.com/office/drawing/2014/main" id="{097D16AF-9A2C-AD79-467F-8CF1BA6989B4}"/>
+              </a:ext>
+            </a:extLst>
+          </p:cNvPr>
+          <p:cNvSpPr txBox="1"/>
+          <p:nvPr/>
+        </p:nvSpPr>
+        <p:spPr>
+          <a:xfrm>
+            <a:off x="959884" y="2913254"/>
+            <a:ext cx="2414690" cy="584775"/>
+          </a:xfrm>
+          <a:prstGeom prst="rect">
+            <a:avLst/>
+          </a:prstGeom>
+        </p:spPr>
+        <p:style>
+          <a:lnRef idx="2">
+            <a:schemeClr val="dk1"/>
+          </a:lnRef>
+          <a:fillRef idx="1">
+            <a:schemeClr val="lt1"/>
+          </a:fillRef>
+          <a:effectRef idx="0">
+            <a:schemeClr val="dk1"/>
+          </a:effectRef>
+          <a:fontRef idx="minor">
+            <a:schemeClr val="dk1"/>
+          </a:fontRef>
+        </p:style>
+        <p:txBody>
+          <a:bodyPr wrap="square" rtlCol="0">
+            <a:spAutoFit/>
+          </a:bodyPr>
+          <a:lstStyle/>
+          <a:p>
+            <a:pPr marL="285750" indent="-285750">
+              <a:buFontTx/>
+              <a:buChar char="-"/>
+            </a:pPr>
+            <a:r>
+              <a:rPr lang="en-GB" sz="1600" dirty="0"/>
+              <a:t>Microfluidics </a:t>
+            </a:r>
+          </a:p>
+          <a:p>
+            <a:pPr marL="285750" indent="-285750">
+              <a:buFontTx/>
+              <a:buChar char="-"/>
+            </a:pPr>
+            <a:r>
+              <a:rPr lang="en-GB" sz="1600" dirty="0"/>
+              <a:t>Microscopy on-the-go</a:t>
+            </a:r>
+          </a:p>
+        </p:txBody>
+      </p:sp>
+      <p:sp>
+        <p:nvSpPr>
+          <p:cNvPr id="28" name="Textfeld 27">
+            <a:extLst>
+              <a:ext uri="{FF2B5EF4-FFF2-40B4-BE49-F238E27FC236}">
+                <a16:creationId xmlns:a16="http://schemas.microsoft.com/office/drawing/2014/main" id="{CFD4D90F-4E68-0DE5-C94F-4A8B197705C4}"/>
+              </a:ext>
+            </a:extLst>
+          </p:cNvPr>
+          <p:cNvSpPr txBox="1"/>
+          <p:nvPr/>
+        </p:nvSpPr>
+        <p:spPr>
+          <a:xfrm>
+            <a:off x="10386911" y="3051753"/>
+            <a:ext cx="2414690" cy="584775"/>
+          </a:xfrm>
+          <a:prstGeom prst="rect">
+            <a:avLst/>
+          </a:prstGeom>
+        </p:spPr>
+        <p:style>
+          <a:lnRef idx="2">
+            <a:schemeClr val="dk1"/>
+          </a:lnRef>
+          <a:fillRef idx="1">
+            <a:schemeClr val="lt1"/>
+          </a:fillRef>
+          <a:effectRef idx="0">
+            <a:schemeClr val="dk1"/>
+          </a:effectRef>
+          <a:fontRef idx="minor">
+            <a:schemeClr val="dk1"/>
+          </a:fontRef>
+        </p:style>
+        <p:txBody>
+          <a:bodyPr wrap="square" rtlCol="0">
+            <a:spAutoFit/>
+          </a:bodyPr>
+          <a:lstStyle/>
+          <a:p>
+            <a:r>
+              <a:rPr lang="en-GB" sz="1600" dirty="0"/>
+              <a:t>- 24 cameras observing multi </a:t>
+            </a:r>
+            <a:r>
+              <a:rPr lang="en-GB" sz="1600" dirty="0" err="1"/>
+              <a:t>wellplate</a:t>
+            </a:r>
+            <a:r>
+              <a:rPr lang="en-GB" sz="1600" dirty="0"/>
+              <a:t> wirelessly </a:t>
+            </a:r>
+          </a:p>
+        </p:txBody>
+      </p:sp>
     </p:spTree>
     <p:extLst>
       <p:ext uri="{BB962C8B-B14F-4D97-AF65-F5344CB8AC3E}">

</xml_diff>